<commit_message>
Agrego el codigo que faltaba en la ppt
</commit_message>
<xml_diff>
--- a/Ruby - Presentacion Final.pptx
+++ b/Ruby - Presentacion Final.pptx
@@ -5,10 +5,10 @@
     <p:sldMasterId id="2147483648" r:id="rId1"/>
   </p:sldMasterIdLst>
   <p:notesMasterIdLst>
-    <p:notesMasterId r:id="rId13"/>
+    <p:notesMasterId r:id="rId14"/>
   </p:notesMasterIdLst>
   <p:handoutMasterIdLst>
-    <p:handoutMasterId r:id="rId14"/>
+    <p:handoutMasterId r:id="rId15"/>
   </p:handoutMasterIdLst>
   <p:sldIdLst>
     <p:sldId id="261" r:id="rId2"/>
@@ -21,7 +21,8 @@
     <p:sldId id="268" r:id="rId9"/>
     <p:sldId id="272" r:id="rId10"/>
     <p:sldId id="273" r:id="rId11"/>
-    <p:sldId id="274" r:id="rId12"/>
+    <p:sldId id="275" r:id="rId12"/>
+    <p:sldId id="274" r:id="rId13"/>
   </p:sldIdLst>
   <p:sldSz cx="12192000" cy="6858000"/>
   <p:notesSz cx="6858000" cy="9144000"/>
@@ -232,7 +233,7 @@
           <a:p>
             <a:fld id="{59041DB8-B66F-4DC8-A96E-33677E0F90FF}" type="datetimeFigureOut">
               <a:rPr lang="en-US" smtClean="0"/>
-              <a:t>11/26/2019</a:t>
+              <a:t>11/27/2019</a:t>
             </a:fld>
             <a:endParaRPr lang="en-US"/>
           </a:p>
@@ -397,7 +398,7 @@
           <a:p>
             <a:fld id="{DEB49C4A-65AC-492D-9701-81B46C3AD0E4}" type="datetimeFigureOut">
               <a:rPr lang="en-US" smtClean="0"/>
-              <a:t>11/26/2019</a:t>
+              <a:t>11/27/2019</a:t>
             </a:fld>
             <a:endParaRPr lang="en-US"/>
           </a:p>
@@ -2889,7 +2890,7 @@
           <a:p>
             <a:fld id="{384A29A4-78C8-47AB-BA06-22CB45938951}" type="datetime1">
               <a:rPr lang="en-US" smtClean="0"/>
-              <a:t>11/26/2019</a:t>
+              <a:t>11/27/2019</a:t>
             </a:fld>
             <a:endParaRPr lang="en-US"/>
           </a:p>
@@ -3084,7 +3085,7 @@
           <a:p>
             <a:fld id="{E1ED4ACF-2D82-46F2-A8E9-23963AA34E86}" type="datetime1">
               <a:rPr lang="en-US" smtClean="0"/>
-              <a:t>11/26/2019</a:t>
+              <a:t>11/27/2019</a:t>
             </a:fld>
             <a:endParaRPr lang="en-US"/>
           </a:p>
@@ -3268,7 +3269,7 @@
           <a:p>
             <a:fld id="{AE374B5B-21A0-4192-BF4C-38187F1A68D8}" type="datetime1">
               <a:rPr lang="en-US" smtClean="0"/>
-              <a:t>11/26/2019</a:t>
+              <a:t>11/27/2019</a:t>
             </a:fld>
             <a:endParaRPr lang="en-US"/>
           </a:p>
@@ -5609,7 +5610,7 @@
           <a:p>
             <a:fld id="{33B5CF7C-B333-48E1-A4A6-83A3C8B73AC0}" type="datetime1">
               <a:rPr lang="en-US" smtClean="0"/>
-              <a:t>11/26/2019</a:t>
+              <a:t>11/27/2019</a:t>
             </a:fld>
             <a:endParaRPr lang="en-US"/>
           </a:p>
@@ -6062,7 +6063,7 @@
           <a:p>
             <a:fld id="{AE320762-5CBF-4210-AB54-376B091119F8}" type="datetime1">
               <a:rPr lang="en-US" smtClean="0"/>
-              <a:t>11/26/2019</a:t>
+              <a:t>11/27/2019</a:t>
             </a:fld>
             <a:endParaRPr lang="en-US"/>
           </a:p>
@@ -6194,7 +6195,7 @@
           <a:p>
             <a:fld id="{7F0DB371-BF5F-4058-A212-1A908E4D2674}" type="datetime1">
               <a:rPr lang="en-US" smtClean="0"/>
-              <a:t>11/26/2019</a:t>
+              <a:t>11/27/2019</a:t>
             </a:fld>
             <a:endParaRPr lang="en-US"/>
           </a:p>
@@ -8127,7 +8128,7 @@
           <a:p>
             <a:fld id="{60A4083B-90AA-48CF-BAD5-00AA24D7F288}" type="datetime1">
               <a:rPr lang="en-US" smtClean="0"/>
-              <a:t>11/26/2019</a:t>
+              <a:t>11/27/2019</a:t>
             </a:fld>
             <a:endParaRPr lang="en-US"/>
           </a:p>
@@ -10386,7 +10387,7 @@
             <a:fld id="{F5BAF629-ECA2-4CF3-B790-9D9BDED98269}" type="datetime1">
               <a:rPr lang="en-US" smtClean="0"/>
               <a:pPr/>
-              <a:t>11/26/2019</a:t>
+              <a:t>11/27/2019</a:t>
             </a:fld>
             <a:endParaRPr lang="en-US"/>
           </a:p>
@@ -14681,7 +14682,7 @@
             <a:fld id="{B51B2453-8663-4C69-AF73-9FD7B1DEC5D0}" type="datetime1">
               <a:rPr lang="en-US" smtClean="0"/>
               <a:pPr/>
-              <a:t>11/26/2019</a:t>
+              <a:t>11/27/2019</a:t>
             </a:fld>
             <a:endParaRPr lang="en-US" dirty="0"/>
           </a:p>
@@ -15792,6 +15793,323 @@
 </file>
 
 <file path=ppt/slides/slide11.xml><?xml version="1.0" encoding="utf-8"?>
+<p:sld xmlns:a="http://schemas.openxmlformats.org/drawingml/2006/main" xmlns:r="http://schemas.openxmlformats.org/officeDocument/2006/relationships" xmlns:p="http://schemas.openxmlformats.org/presentationml/2006/main">
+  <p:cSld>
+    <p:spTree>
+      <p:nvGrpSpPr>
+        <p:cNvPr id="1" name=""/>
+        <p:cNvGrpSpPr/>
+        <p:nvPr/>
+      </p:nvGrpSpPr>
+      <p:grpSpPr>
+        <a:xfrm>
+          <a:off x="0" y="0"/>
+          <a:ext cx="0" cy="0"/>
+          <a:chOff x="0" y="0"/>
+          <a:chExt cx="0" cy="0"/>
+        </a:xfrm>
+      </p:grpSpPr>
+      <p:sp>
+        <p:nvSpPr>
+          <p:cNvPr id="2" name="Title 1">
+            <a:extLst>
+              <a:ext uri="{FF2B5EF4-FFF2-40B4-BE49-F238E27FC236}">
+                <a16:creationId xmlns:a16="http://schemas.microsoft.com/office/drawing/2014/main" id="{0040768F-4ED9-47B1-BF7F-B2FCB03C9792}"/>
+              </a:ext>
+            </a:extLst>
+          </p:cNvPr>
+          <p:cNvSpPr txBox="1">
+            <a:spLocks/>
+          </p:cNvSpPr>
+          <p:nvPr/>
+        </p:nvSpPr>
+        <p:spPr>
+          <a:xfrm>
+            <a:off x="3327124" y="505265"/>
+            <a:ext cx="5537752" cy="609600"/>
+          </a:xfrm>
+          <a:prstGeom prst="rect">
+            <a:avLst/>
+          </a:prstGeom>
+        </p:spPr>
+        <p:txBody>
+          <a:bodyPr>
+            <a:normAutofit fontScale="97500" lnSpcReduction="10000"/>
+          </a:bodyPr>
+          <a:lstStyle>
+            <a:lvl1pPr algn="l" defTabSz="914400" rtl="0" eaLnBrk="1" latinLnBrk="0" hangingPunct="1">
+              <a:lnSpc>
+                <a:spcPct val="90000"/>
+              </a:lnSpc>
+              <a:spcBef>
+                <a:spcPct val="0"/>
+              </a:spcBef>
+              <a:buNone/>
+              <a:defRPr sz="3200" b="1" kern="1200">
+                <a:solidFill>
+                  <a:schemeClr val="accent1">
+                    <a:lumMod val="75000"/>
+                  </a:schemeClr>
+                </a:solidFill>
+                <a:latin typeface="+mj-lt"/>
+                <a:ea typeface="+mj-ea"/>
+                <a:cs typeface="+mj-cs"/>
+              </a:defRPr>
+            </a:lvl1pPr>
+          </a:lstStyle>
+          <a:p>
+            <a:r>
+              <a:rPr lang="es-AR" sz="4000" dirty="0"/>
+              <a:t>Un poco de la sintaxis</a:t>
+            </a:r>
+            <a:endParaRPr lang="en-US" sz="4000" dirty="0"/>
+          </a:p>
+        </p:txBody>
+      </p:sp>
+      <p:pic>
+        <p:nvPicPr>
+          <p:cNvPr id="4" name="Picture 3" descr="A picture containing room&#10;&#10;Description automatically generated">
+            <a:extLst>
+              <a:ext uri="{FF2B5EF4-FFF2-40B4-BE49-F238E27FC236}">
+                <a16:creationId xmlns:a16="http://schemas.microsoft.com/office/drawing/2014/main" id="{7F4A62A1-C436-4E59-AD52-2FA1EBFFB810}"/>
+              </a:ext>
+            </a:extLst>
+          </p:cNvPr>
+          <p:cNvPicPr>
+            <a:picLocks noChangeAspect="1"/>
+          </p:cNvPicPr>
+          <p:nvPr/>
+        </p:nvPicPr>
+        <p:blipFill>
+          <a:blip r:embed="rId2"/>
+          <a:stretch>
+            <a:fillRect/>
+          </a:stretch>
+        </p:blipFill>
+        <p:spPr>
+          <a:xfrm>
+            <a:off x="3961813" y="3727860"/>
+            <a:ext cx="4268373" cy="3130140"/>
+          </a:xfrm>
+          <a:prstGeom prst="rect">
+            <a:avLst/>
+          </a:prstGeom>
+        </p:spPr>
+      </p:pic>
+      <p:sp>
+        <p:nvSpPr>
+          <p:cNvPr id="5" name="TextBox 4">
+            <a:extLst>
+              <a:ext uri="{FF2B5EF4-FFF2-40B4-BE49-F238E27FC236}">
+                <a16:creationId xmlns:a16="http://schemas.microsoft.com/office/drawing/2014/main" id="{7AB5847E-1269-4C07-8B48-B7E04E3399B8}"/>
+              </a:ext>
+            </a:extLst>
+          </p:cNvPr>
+          <p:cNvSpPr txBox="1"/>
+          <p:nvPr/>
+        </p:nvSpPr>
+        <p:spPr>
+          <a:xfrm rot="354793">
+            <a:off x="1594301" y="1866095"/>
+            <a:ext cx="2735621" cy="1384995"/>
+          </a:xfrm>
+          <a:prstGeom prst="rect">
+            <a:avLst/>
+          </a:prstGeom>
+          <a:noFill/>
+        </p:spPr>
+        <p:txBody>
+          <a:bodyPr wrap="square" rtlCol="0">
+            <a:spAutoFit/>
+          </a:bodyPr>
+          <a:lstStyle/>
+          <a:p>
+            <a:r>
+              <a:rPr lang="en-US" sz="2800" dirty="0"/>
+              <a:t>module </a:t>
+            </a:r>
+            <a:r>
+              <a:rPr lang="en-US" sz="2800" dirty="0" err="1"/>
+              <a:t>Nombre</a:t>
+            </a:r>
+            <a:endParaRPr lang="en-US" sz="2800" dirty="0"/>
+          </a:p>
+          <a:p>
+            <a:r>
+              <a:rPr lang="en-US" sz="2800" dirty="0"/>
+              <a:t>…</a:t>
+            </a:r>
+          </a:p>
+          <a:p>
+            <a:r>
+              <a:rPr lang="en-US" sz="2800" dirty="0"/>
+              <a:t>end</a:t>
+            </a:r>
+          </a:p>
+        </p:txBody>
+      </p:sp>
+      <p:sp>
+        <p:nvSpPr>
+          <p:cNvPr id="6" name="Rectangle 5">
+            <a:extLst>
+              <a:ext uri="{FF2B5EF4-FFF2-40B4-BE49-F238E27FC236}">
+                <a16:creationId xmlns:a16="http://schemas.microsoft.com/office/drawing/2014/main" id="{C906CE41-56BE-4267-B42E-D2FB025BD669}"/>
+              </a:ext>
+            </a:extLst>
+          </p:cNvPr>
+          <p:cNvSpPr/>
+          <p:nvPr/>
+        </p:nvSpPr>
+        <p:spPr>
+          <a:xfrm rot="21370638">
+            <a:off x="7038193" y="1728865"/>
+            <a:ext cx="2383986" cy="1384995"/>
+          </a:xfrm>
+          <a:prstGeom prst="rect">
+            <a:avLst/>
+          </a:prstGeom>
+        </p:spPr>
+        <p:txBody>
+          <a:bodyPr wrap="none">
+            <a:spAutoFit/>
+          </a:bodyPr>
+          <a:lstStyle/>
+          <a:p>
+            <a:r>
+              <a:rPr lang="en-US" sz="2800" dirty="0"/>
+              <a:t>class </a:t>
+            </a:r>
+            <a:r>
+              <a:rPr lang="en-US" sz="2800" dirty="0" err="1"/>
+              <a:t>Nombre</a:t>
+            </a:r>
+            <a:endParaRPr lang="en-US" sz="2800" dirty="0"/>
+          </a:p>
+          <a:p>
+            <a:r>
+              <a:rPr lang="en-US" sz="2800" dirty="0"/>
+              <a:t>…</a:t>
+            </a:r>
+          </a:p>
+          <a:p>
+            <a:r>
+              <a:rPr lang="en-US" sz="2800" dirty="0"/>
+              <a:t>end</a:t>
+            </a:r>
+          </a:p>
+        </p:txBody>
+      </p:sp>
+      <p:sp>
+        <p:nvSpPr>
+          <p:cNvPr id="7" name="Rectangle 6">
+            <a:extLst>
+              <a:ext uri="{FF2B5EF4-FFF2-40B4-BE49-F238E27FC236}">
+                <a16:creationId xmlns:a16="http://schemas.microsoft.com/office/drawing/2014/main" id="{F50B4F92-661F-42F2-9B9B-F50B09439CF6}"/>
+              </a:ext>
+            </a:extLst>
+          </p:cNvPr>
+          <p:cNvSpPr/>
+          <p:nvPr/>
+        </p:nvSpPr>
+        <p:spPr>
+          <a:xfrm rot="357604">
+            <a:off x="9361672" y="4297730"/>
+            <a:ext cx="2064989" cy="1384995"/>
+          </a:xfrm>
+          <a:prstGeom prst="rect">
+            <a:avLst/>
+          </a:prstGeom>
+        </p:spPr>
+        <p:txBody>
+          <a:bodyPr wrap="none">
+            <a:spAutoFit/>
+          </a:bodyPr>
+          <a:lstStyle/>
+          <a:p>
+            <a:r>
+              <a:rPr lang="en-US" sz="2800" dirty="0"/>
+              <a:t>def </a:t>
+            </a:r>
+            <a:r>
+              <a:rPr lang="en-US" sz="2800" dirty="0" err="1"/>
+              <a:t>Nombre</a:t>
+            </a:r>
+            <a:endParaRPr lang="en-US" sz="2800" dirty="0"/>
+          </a:p>
+          <a:p>
+            <a:r>
+              <a:rPr lang="en-US" sz="2800" dirty="0"/>
+              <a:t>…</a:t>
+            </a:r>
+          </a:p>
+          <a:p>
+            <a:r>
+              <a:rPr lang="en-US" sz="2800" dirty="0"/>
+              <a:t>end </a:t>
+            </a:r>
+          </a:p>
+        </p:txBody>
+      </p:sp>
+      <p:sp>
+        <p:nvSpPr>
+          <p:cNvPr id="8" name="Rectangle 7">
+            <a:extLst>
+              <a:ext uri="{FF2B5EF4-FFF2-40B4-BE49-F238E27FC236}">
+                <a16:creationId xmlns:a16="http://schemas.microsoft.com/office/drawing/2014/main" id="{C533D657-B4E6-4E3B-8722-E60F2BEE184B}"/>
+              </a:ext>
+            </a:extLst>
+          </p:cNvPr>
+          <p:cNvSpPr/>
+          <p:nvPr/>
+        </p:nvSpPr>
+        <p:spPr>
+          <a:xfrm rot="19791308">
+            <a:off x="769524" y="4558291"/>
+            <a:ext cx="1893467" cy="523220"/>
+          </a:xfrm>
+          <a:prstGeom prst="rect">
+            <a:avLst/>
+          </a:prstGeom>
+        </p:spPr>
+        <p:txBody>
+          <a:bodyPr wrap="none">
+            <a:spAutoFit/>
+          </a:bodyPr>
+          <a:lstStyle/>
+          <a:p>
+            <a:r>
+              <a:rPr lang="en-US" sz="2800" b="1" dirty="0"/>
+              <a:t>@variable</a:t>
+            </a:r>
+          </a:p>
+        </p:txBody>
+      </p:sp>
+    </p:spTree>
+    <p:extLst>
+      <p:ext uri="{BB962C8B-B14F-4D97-AF65-F5344CB8AC3E}">
+        <p14:creationId xmlns:p14="http://schemas.microsoft.com/office/powerpoint/2010/main" val="3433753016"/>
+      </p:ext>
+    </p:extLst>
+  </p:cSld>
+  <p:clrMapOvr>
+    <a:masterClrMapping/>
+  </p:clrMapOvr>
+  <mc:AlternateContent xmlns:mc="http://schemas.openxmlformats.org/markup-compatibility/2006" xmlns:p14="http://schemas.microsoft.com/office/powerpoint/2010/main">
+    <mc:Choice Requires="p14">
+      <p:transition spd="med" p14:dur="700">
+        <p:fade/>
+      </p:transition>
+    </mc:Choice>
+    <mc:Fallback xmlns="">
+      <p:transition spd="med">
+        <p:fade/>
+      </p:transition>
+    </mc:Fallback>
+  </mc:AlternateContent>
+</p:sld>
+</file>
+
+<file path=ppt/slides/slide12.xml><?xml version="1.0" encoding="utf-8"?>
 <p:sld xmlns:a="http://schemas.openxmlformats.org/drawingml/2006/main" xmlns:r="http://schemas.openxmlformats.org/officeDocument/2006/relationships" xmlns:p="http://schemas.openxmlformats.org/presentationml/2006/main">
   <p:cSld>
     <p:spTree>

</xml_diff>